<commit_message>
NotaPowerpointTest, NullObjecttest, MissingPlaceholdersTest, MissingDataTest and Exception Handling
</commit_message>
<xml_diff>
--- a/TestSlideAssembler/Template.pptx
+++ b/TestSlideAssembler/Template.pptx
@@ -1115,7 +1115,7 @@
           <a:p>
             <a:fld id="{00219EEC-8365-4023-B333-35C696E1BD8E}" type="datetimeFigureOut">
               <a:rPr lang="de-AT" smtClean="0"/>
-              <a:t>13.06.2024</a:t>
+              <a:t>31.07.2024</a:t>
             </a:fld>
             <a:endParaRPr lang="de-AT"/>
           </a:p>
@@ -1315,7 +1315,7 @@
           <a:p>
             <a:fld id="{00219EEC-8365-4023-B333-35C696E1BD8E}" type="datetimeFigureOut">
               <a:rPr lang="de-AT" smtClean="0"/>
-              <a:t>13.06.2024</a:t>
+              <a:t>31.07.2024</a:t>
             </a:fld>
             <a:endParaRPr lang="de-AT"/>
           </a:p>
@@ -1525,7 +1525,7 @@
           <a:p>
             <a:fld id="{00219EEC-8365-4023-B333-35C696E1BD8E}" type="datetimeFigureOut">
               <a:rPr lang="de-AT" smtClean="0"/>
-              <a:t>13.06.2024</a:t>
+              <a:t>31.07.2024</a:t>
             </a:fld>
             <a:endParaRPr lang="de-AT"/>
           </a:p>
@@ -1725,7 +1725,7 @@
           <a:p>
             <a:fld id="{00219EEC-8365-4023-B333-35C696E1BD8E}" type="datetimeFigureOut">
               <a:rPr lang="de-AT" smtClean="0"/>
-              <a:t>13.06.2024</a:t>
+              <a:t>31.07.2024</a:t>
             </a:fld>
             <a:endParaRPr lang="de-AT"/>
           </a:p>
@@ -2001,7 +2001,7 @@
           <a:p>
             <a:fld id="{00219EEC-8365-4023-B333-35C696E1BD8E}" type="datetimeFigureOut">
               <a:rPr lang="de-AT" smtClean="0"/>
-              <a:t>13.06.2024</a:t>
+              <a:t>31.07.2024</a:t>
             </a:fld>
             <a:endParaRPr lang="de-AT"/>
           </a:p>
@@ -2269,7 +2269,7 @@
           <a:p>
             <a:fld id="{00219EEC-8365-4023-B333-35C696E1BD8E}" type="datetimeFigureOut">
               <a:rPr lang="de-AT" smtClean="0"/>
-              <a:t>13.06.2024</a:t>
+              <a:t>31.07.2024</a:t>
             </a:fld>
             <a:endParaRPr lang="de-AT"/>
           </a:p>
@@ -2684,7 +2684,7 @@
           <a:p>
             <a:fld id="{00219EEC-8365-4023-B333-35C696E1BD8E}" type="datetimeFigureOut">
               <a:rPr lang="de-AT" smtClean="0"/>
-              <a:t>13.06.2024</a:t>
+              <a:t>31.07.2024</a:t>
             </a:fld>
             <a:endParaRPr lang="de-AT"/>
           </a:p>
@@ -2826,7 +2826,7 @@
           <a:p>
             <a:fld id="{00219EEC-8365-4023-B333-35C696E1BD8E}" type="datetimeFigureOut">
               <a:rPr lang="de-AT" smtClean="0"/>
-              <a:t>13.06.2024</a:t>
+              <a:t>31.07.2024</a:t>
             </a:fld>
             <a:endParaRPr lang="de-AT"/>
           </a:p>
@@ -2939,7 +2939,7 @@
           <a:p>
             <a:fld id="{00219EEC-8365-4023-B333-35C696E1BD8E}" type="datetimeFigureOut">
               <a:rPr lang="de-AT" smtClean="0"/>
-              <a:t>13.06.2024</a:t>
+              <a:t>31.07.2024</a:t>
             </a:fld>
             <a:endParaRPr lang="de-AT"/>
           </a:p>
@@ -3252,7 +3252,7 @@
           <a:p>
             <a:fld id="{00219EEC-8365-4023-B333-35C696E1BD8E}" type="datetimeFigureOut">
               <a:rPr lang="de-AT" smtClean="0"/>
-              <a:t>13.06.2024</a:t>
+              <a:t>31.07.2024</a:t>
             </a:fld>
             <a:endParaRPr lang="de-AT"/>
           </a:p>
@@ -3541,7 +3541,7 @@
           <a:p>
             <a:fld id="{00219EEC-8365-4023-B333-35C696E1BD8E}" type="datetimeFigureOut">
               <a:rPr lang="de-AT" smtClean="0"/>
-              <a:t>13.06.2024</a:t>
+              <a:t>31.07.2024</a:t>
             </a:fld>
             <a:endParaRPr lang="de-AT"/>
           </a:p>
@@ -3784,7 +3784,7 @@
           <a:p>
             <a:fld id="{00219EEC-8365-4023-B333-35C696E1BD8E}" type="datetimeFigureOut">
               <a:rPr lang="de-AT" smtClean="0"/>
-              <a:t>13.06.2024</a:t>
+              <a:t>31.07.2024</a:t>
             </a:fld>
             <a:endParaRPr lang="de-AT"/>
           </a:p>

</xml_diff>

<commit_message>
fixed issues which occured while testing ignoreMissingData
</commit_message>
<xml_diff>
--- a/TestSlideAssembler/Template.pptx
+++ b/TestSlideAssembler/Template.pptx
@@ -1124,7 +1124,7 @@
           <a:p>
             <a:fld id="{00219EEC-8365-4023-B333-35C696E1BD8E}" type="datetimeFigureOut">
               <a:rPr lang="de-AT" smtClean="0"/>
-              <a:t>06.10.2024</a:t>
+              <a:t>31.10.2024</a:t>
             </a:fld>
             <a:endParaRPr lang="de-AT"/>
           </a:p>
@@ -1324,7 +1324,7 @@
           <a:p>
             <a:fld id="{00219EEC-8365-4023-B333-35C696E1BD8E}" type="datetimeFigureOut">
               <a:rPr lang="de-AT" smtClean="0"/>
-              <a:t>06.10.2024</a:t>
+              <a:t>31.10.2024</a:t>
             </a:fld>
             <a:endParaRPr lang="de-AT"/>
           </a:p>
@@ -1534,7 +1534,7 @@
           <a:p>
             <a:fld id="{00219EEC-8365-4023-B333-35C696E1BD8E}" type="datetimeFigureOut">
               <a:rPr lang="de-AT" smtClean="0"/>
-              <a:t>06.10.2024</a:t>
+              <a:t>31.10.2024</a:t>
             </a:fld>
             <a:endParaRPr lang="de-AT"/>
           </a:p>
@@ -1734,7 +1734,7 @@
           <a:p>
             <a:fld id="{00219EEC-8365-4023-B333-35C696E1BD8E}" type="datetimeFigureOut">
               <a:rPr lang="de-AT" smtClean="0"/>
-              <a:t>06.10.2024</a:t>
+              <a:t>31.10.2024</a:t>
             </a:fld>
             <a:endParaRPr lang="de-AT"/>
           </a:p>
@@ -2010,7 +2010,7 @@
           <a:p>
             <a:fld id="{00219EEC-8365-4023-B333-35C696E1BD8E}" type="datetimeFigureOut">
               <a:rPr lang="de-AT" smtClean="0"/>
-              <a:t>06.10.2024</a:t>
+              <a:t>31.10.2024</a:t>
             </a:fld>
             <a:endParaRPr lang="de-AT"/>
           </a:p>
@@ -2278,7 +2278,7 @@
           <a:p>
             <a:fld id="{00219EEC-8365-4023-B333-35C696E1BD8E}" type="datetimeFigureOut">
               <a:rPr lang="de-AT" smtClean="0"/>
-              <a:t>06.10.2024</a:t>
+              <a:t>31.10.2024</a:t>
             </a:fld>
             <a:endParaRPr lang="de-AT"/>
           </a:p>
@@ -2693,7 +2693,7 @@
           <a:p>
             <a:fld id="{00219EEC-8365-4023-B333-35C696E1BD8E}" type="datetimeFigureOut">
               <a:rPr lang="de-AT" smtClean="0"/>
-              <a:t>06.10.2024</a:t>
+              <a:t>31.10.2024</a:t>
             </a:fld>
             <a:endParaRPr lang="de-AT"/>
           </a:p>
@@ -2835,7 +2835,7 @@
           <a:p>
             <a:fld id="{00219EEC-8365-4023-B333-35C696E1BD8E}" type="datetimeFigureOut">
               <a:rPr lang="de-AT" smtClean="0"/>
-              <a:t>06.10.2024</a:t>
+              <a:t>31.10.2024</a:t>
             </a:fld>
             <a:endParaRPr lang="de-AT"/>
           </a:p>
@@ -2948,7 +2948,7 @@
           <a:p>
             <a:fld id="{00219EEC-8365-4023-B333-35C696E1BD8E}" type="datetimeFigureOut">
               <a:rPr lang="de-AT" smtClean="0"/>
-              <a:t>06.10.2024</a:t>
+              <a:t>31.10.2024</a:t>
             </a:fld>
             <a:endParaRPr lang="de-AT"/>
           </a:p>
@@ -3261,7 +3261,7 @@
           <a:p>
             <a:fld id="{00219EEC-8365-4023-B333-35C696E1BD8E}" type="datetimeFigureOut">
               <a:rPr lang="de-AT" smtClean="0"/>
-              <a:t>06.10.2024</a:t>
+              <a:t>31.10.2024</a:t>
             </a:fld>
             <a:endParaRPr lang="de-AT"/>
           </a:p>
@@ -3550,7 +3550,7 @@
           <a:p>
             <a:fld id="{00219EEC-8365-4023-B333-35C696E1BD8E}" type="datetimeFigureOut">
               <a:rPr lang="de-AT" smtClean="0"/>
-              <a:t>06.10.2024</a:t>
+              <a:t>31.10.2024</a:t>
             </a:fld>
             <a:endParaRPr lang="de-AT"/>
           </a:p>
@@ -3793,7 +3793,7 @@
           <a:p>
             <a:fld id="{00219EEC-8365-4023-B333-35C696E1BD8E}" type="datetimeFigureOut">
               <a:rPr lang="de-AT" smtClean="0"/>
-              <a:t>06.10.2024</a:t>
+              <a:t>31.10.2024</a:t>
             </a:fld>
             <a:endParaRPr lang="de-AT"/>
           </a:p>
@@ -4600,6 +4600,45 @@
           </a:p>
         </p:txBody>
       </p:sp>
+      <p:pic>
+        <p:nvPicPr>
+          <p:cNvPr id="9" name="Logo" descr="Ein Bild, das Grafiken, Screenshot, Design enthält.&#10;&#10;Automatisch generierte Beschreibung">
+            <a:extLst>
+              <a:ext uri="{FF2B5EF4-FFF2-40B4-BE49-F238E27FC236}">
+                <a16:creationId xmlns:a16="http://schemas.microsoft.com/office/drawing/2014/main" id="{F9370EAB-D38A-4932-D354-535FD6BF17E4}"/>
+              </a:ext>
+            </a:extLst>
+          </p:cNvPr>
+          <p:cNvPicPr>
+            <a:picLocks noChangeAspect="1"/>
+          </p:cNvPicPr>
+          <p:nvPr/>
+        </p:nvPicPr>
+        <p:blipFill>
+          <a:blip r:embed="rId2">
+            <a:extLst>
+              <a:ext uri="{28A0092B-C50C-407E-A947-70E740481C1C}">
+                <a14:useLocalDpi xmlns:a14="http://schemas.microsoft.com/office/drawing/2010/main" val="0"/>
+              </a:ext>
+              <a:ext uri="{837473B0-CC2E-450A-ABE3-18F120FF3D39}">
+                <a1611:picAttrSrcUrl xmlns:a1611="http://schemas.microsoft.com/office/drawing/2016/11/main" r:id="rId3"/>
+              </a:ext>
+            </a:extLst>
+          </a:blip>
+          <a:stretch>
+            <a:fillRect/>
+          </a:stretch>
+        </p:blipFill>
+        <p:spPr>
+          <a:xfrm>
+            <a:off x="9862678" y="2486619"/>
+            <a:ext cx="1204284" cy="1241417"/>
+          </a:xfrm>
+          <a:prstGeom prst="rect">
+            <a:avLst/>
+          </a:prstGeom>
+        </p:spPr>
+      </p:pic>
     </p:spTree>
     <p:extLst>
       <p:ext uri="{BB962C8B-B14F-4D97-AF65-F5344CB8AC3E}">

</xml_diff>